<commit_message>
Updated architecture diagram and README to include details of Comprehend processing.
</commit_message>
<xml_diff>
--- a/diagrams/diagrams.pptx
+++ b/diagrams/diagrams.pptx
@@ -243,7 +243,7 @@
           <a:p>
             <a:fld id="{5F0206EE-F780-3540-8A2E-70FAE95803E7}" type="datetimeFigureOut">
               <a:rPr lang="en-US" smtClean="0"/>
-              <a:t>10/29/17</a:t>
+              <a:t>1/3/18</a:t>
             </a:fld>
             <a:endParaRPr lang="en-US"/>
           </a:p>
@@ -413,7 +413,7 @@
           <a:p>
             <a:fld id="{5F0206EE-F780-3540-8A2E-70FAE95803E7}" type="datetimeFigureOut">
               <a:rPr lang="en-US" smtClean="0"/>
-              <a:t>10/29/17</a:t>
+              <a:t>1/3/18</a:t>
             </a:fld>
             <a:endParaRPr lang="en-US"/>
           </a:p>
@@ -593,7 +593,7 @@
           <a:p>
             <a:fld id="{5F0206EE-F780-3540-8A2E-70FAE95803E7}" type="datetimeFigureOut">
               <a:rPr lang="en-US" smtClean="0"/>
-              <a:t>10/29/17</a:t>
+              <a:t>1/3/18</a:t>
             </a:fld>
             <a:endParaRPr lang="en-US"/>
           </a:p>
@@ -763,7 +763,7 @@
           <a:p>
             <a:fld id="{5F0206EE-F780-3540-8A2E-70FAE95803E7}" type="datetimeFigureOut">
               <a:rPr lang="en-US" smtClean="0"/>
-              <a:t>10/29/17</a:t>
+              <a:t>1/3/18</a:t>
             </a:fld>
             <a:endParaRPr lang="en-US"/>
           </a:p>
@@ -1009,7 +1009,7 @@
           <a:p>
             <a:fld id="{5F0206EE-F780-3540-8A2E-70FAE95803E7}" type="datetimeFigureOut">
               <a:rPr lang="en-US" smtClean="0"/>
-              <a:t>10/29/17</a:t>
+              <a:t>1/3/18</a:t>
             </a:fld>
             <a:endParaRPr lang="en-US"/>
           </a:p>
@@ -1241,7 +1241,7 @@
           <a:p>
             <a:fld id="{5F0206EE-F780-3540-8A2E-70FAE95803E7}" type="datetimeFigureOut">
               <a:rPr lang="en-US" smtClean="0"/>
-              <a:t>10/29/17</a:t>
+              <a:t>1/3/18</a:t>
             </a:fld>
             <a:endParaRPr lang="en-US"/>
           </a:p>
@@ -1608,7 +1608,7 @@
           <a:p>
             <a:fld id="{5F0206EE-F780-3540-8A2E-70FAE95803E7}" type="datetimeFigureOut">
               <a:rPr lang="en-US" smtClean="0"/>
-              <a:t>10/29/17</a:t>
+              <a:t>1/3/18</a:t>
             </a:fld>
             <a:endParaRPr lang="en-US"/>
           </a:p>
@@ -1726,7 +1726,7 @@
           <a:p>
             <a:fld id="{5F0206EE-F780-3540-8A2E-70FAE95803E7}" type="datetimeFigureOut">
               <a:rPr lang="en-US" smtClean="0"/>
-              <a:t>10/29/17</a:t>
+              <a:t>1/3/18</a:t>
             </a:fld>
             <a:endParaRPr lang="en-US"/>
           </a:p>
@@ -1821,7 +1821,7 @@
           <a:p>
             <a:fld id="{5F0206EE-F780-3540-8A2E-70FAE95803E7}" type="datetimeFigureOut">
               <a:rPr lang="en-US" smtClean="0"/>
-              <a:t>10/29/17</a:t>
+              <a:t>1/3/18</a:t>
             </a:fld>
             <a:endParaRPr lang="en-US"/>
           </a:p>
@@ -2098,7 +2098,7 @@
           <a:p>
             <a:fld id="{5F0206EE-F780-3540-8A2E-70FAE95803E7}" type="datetimeFigureOut">
               <a:rPr lang="en-US" smtClean="0"/>
-              <a:t>10/29/17</a:t>
+              <a:t>1/3/18</a:t>
             </a:fld>
             <a:endParaRPr lang="en-US"/>
           </a:p>
@@ -2351,7 +2351,7 @@
           <a:p>
             <a:fld id="{5F0206EE-F780-3540-8A2E-70FAE95803E7}" type="datetimeFigureOut">
               <a:rPr lang="en-US" smtClean="0"/>
-              <a:t>10/29/17</a:t>
+              <a:t>1/3/18</a:t>
             </a:fld>
             <a:endParaRPr lang="en-US"/>
           </a:p>
@@ -2564,7 +2564,7 @@
           <a:p>
             <a:fld id="{5F0206EE-F780-3540-8A2E-70FAE95803E7}" type="datetimeFigureOut">
               <a:rPr lang="en-US" smtClean="0"/>
-              <a:t>10/29/17</a:t>
+              <a:t>1/3/18</a:t>
             </a:fld>
             <a:endParaRPr lang="en-US"/>
           </a:p>
@@ -2977,8 +2977,8 @@
         </p:nvSpPr>
         <p:spPr>
           <a:xfrm>
-            <a:off x="245806" y="466614"/>
-            <a:ext cx="11641394" cy="5680186"/>
+            <a:off x="125156" y="501445"/>
+            <a:ext cx="11821038" cy="6233652"/>
           </a:xfrm>
           <a:prstGeom prst="roundRect">
             <a:avLst>
@@ -3053,7 +3053,7 @@
         </p:blipFill>
         <p:spPr>
           <a:xfrm>
-            <a:off x="768261" y="183027"/>
+            <a:off x="768261" y="271515"/>
             <a:ext cx="603504" cy="393954"/>
           </a:xfrm>
           <a:prstGeom prst="rect">
@@ -3069,8 +3069,8 @@
         </p:nvSpPr>
         <p:spPr>
           <a:xfrm>
-            <a:off x="746109" y="2303287"/>
-            <a:ext cx="2165456" cy="1958359"/>
+            <a:off x="521711" y="2699219"/>
+            <a:ext cx="2461346" cy="2181854"/>
           </a:xfrm>
           <a:prstGeom prst="roundRect">
             <a:avLst>
@@ -3145,7 +3145,7 @@
         </p:blipFill>
         <p:spPr>
           <a:xfrm>
-            <a:off x="936417" y="2050582"/>
+            <a:off x="781208" y="2447061"/>
             <a:ext cx="599170" cy="391125"/>
           </a:xfrm>
           <a:prstGeom prst="rect">
@@ -3175,7 +3175,7 @@
         </p:blipFill>
         <p:spPr>
           <a:xfrm>
-            <a:off x="4875517" y="2840834"/>
+            <a:off x="4875517" y="3460260"/>
             <a:ext cx="544781" cy="653737"/>
           </a:xfrm>
           <a:prstGeom prst="rect">
@@ -3205,7 +3205,7 @@
         </p:blipFill>
         <p:spPr>
           <a:xfrm>
-            <a:off x="5835155" y="2858338"/>
+            <a:off x="5835155" y="3477764"/>
             <a:ext cx="543745" cy="563883"/>
           </a:xfrm>
           <a:prstGeom prst="rect">
@@ -3235,7 +3235,7 @@
         </p:blipFill>
         <p:spPr>
           <a:xfrm>
-            <a:off x="902223" y="2806889"/>
+            <a:off x="902223" y="3426315"/>
             <a:ext cx="529721" cy="731520"/>
           </a:xfrm>
           <a:prstGeom prst="rect">
@@ -3265,7 +3265,7 @@
         </p:blipFill>
         <p:spPr>
           <a:xfrm>
-            <a:off x="10483219" y="2807948"/>
+            <a:off x="10583379" y="2801351"/>
             <a:ext cx="533234" cy="643018"/>
           </a:xfrm>
           <a:prstGeom prst="rect">
@@ -3275,14 +3275,138 @@
       </p:pic>
       <p:sp>
         <p:nvSpPr>
-          <p:cNvPr id="23" name="Rounded Rectangle 22"/>
+          <p:cNvPr id="24" name="TextBox 23"/>
+          <p:cNvSpPr txBox="1"/>
+          <p:nvPr/>
+        </p:nvSpPr>
+        <p:spPr>
+          <a:xfrm>
+            <a:off x="959691" y="4195201"/>
+            <a:ext cx="403630" cy="246221"/>
+          </a:xfrm>
+          <a:prstGeom prst="rect">
+            <a:avLst/>
+          </a:prstGeom>
+          <a:noFill/>
+        </p:spPr>
+        <p:txBody>
+          <a:bodyPr wrap="square" rtlCol="0">
+            <a:spAutoFit/>
+          </a:bodyPr>
+          <a:lstStyle/>
+          <a:p>
+            <a:r>
+              <a:rPr lang="en-US" sz="1000" dirty="0" smtClean="0"/>
+              <a:t>DBP</a:t>
+            </a:r>
+            <a:endParaRPr lang="en-US" sz="1000" dirty="0"/>
+          </a:p>
+        </p:txBody>
+      </p:sp>
+      <p:sp>
+        <p:nvSpPr>
+          <p:cNvPr id="25" name="TextBox 24"/>
+          <p:cNvSpPr txBox="1"/>
+          <p:nvPr/>
+        </p:nvSpPr>
+        <p:spPr>
+          <a:xfrm>
+            <a:off x="1955838" y="3998592"/>
+            <a:ext cx="750084" cy="246221"/>
+          </a:xfrm>
+          <a:prstGeom prst="rect">
+            <a:avLst/>
+          </a:prstGeom>
+          <a:noFill/>
+        </p:spPr>
+        <p:txBody>
+          <a:bodyPr wrap="square" rtlCol="0">
+            <a:spAutoFit/>
+          </a:bodyPr>
+          <a:lstStyle/>
+          <a:p>
+            <a:pPr algn="ctr"/>
+            <a:r>
+              <a:rPr lang="en-US" sz="1000" dirty="0" err="1" smtClean="0"/>
+              <a:t>ActiveMQ</a:t>
+            </a:r>
+            <a:endParaRPr lang="en-US" sz="1000" dirty="0"/>
+          </a:p>
+        </p:txBody>
+      </p:sp>
+      <p:cxnSp>
+        <p:nvCxnSpPr>
+          <p:cNvPr id="32" name="Straight Arrow Connector 31"/>
+          <p:cNvCxnSpPr/>
+          <p:nvPr/>
+        </p:nvCxnSpPr>
+        <p:spPr>
+          <a:xfrm flipV="1">
+            <a:off x="1535255" y="3793391"/>
+            <a:ext cx="340503" cy="2"/>
+          </a:xfrm>
+          <a:prstGeom prst="straightConnector1">
+            <a:avLst/>
+          </a:prstGeom>
+          <a:ln>
+            <a:tailEnd type="triangle"/>
+          </a:ln>
+        </p:spPr>
+        <p:style>
+          <a:lnRef idx="1">
+            <a:schemeClr val="accent1"/>
+          </a:lnRef>
+          <a:fillRef idx="0">
+            <a:schemeClr val="accent1"/>
+          </a:fillRef>
+          <a:effectRef idx="0">
+            <a:schemeClr val="accent1"/>
+          </a:effectRef>
+          <a:fontRef idx="minor">
+            <a:schemeClr val="tx1"/>
+          </a:fontRef>
+        </p:style>
+      </p:cxnSp>
+      <p:pic>
+        <p:nvPicPr>
+          <p:cNvPr id="22" name="Picture 21"/>
+          <p:cNvPicPr>
+            <a:picLocks noChangeAspect="1"/>
+          </p:cNvPicPr>
+          <p:nvPr/>
+        </p:nvPicPr>
+        <p:blipFill>
+          <a:blip r:embed="rId8">
+            <a:extLst>
+              <a:ext uri="{28A0092B-C50C-407E-A947-70E740481C1C}">
+                <a14:useLocalDpi xmlns:a14="http://schemas.microsoft.com/office/drawing/2010/main" val="0"/>
+              </a:ext>
+            </a:extLst>
+          </a:blip>
+          <a:stretch>
+            <a:fillRect/>
+          </a:stretch>
+        </p:blipFill>
+        <p:spPr>
+          <a:xfrm>
+            <a:off x="1038697" y="3785154"/>
+            <a:ext cx="260271" cy="265456"/>
+          </a:xfrm>
+          <a:prstGeom prst="rect">
+            <a:avLst/>
+          </a:prstGeom>
+        </p:spPr>
+      </p:pic>
+      <p:sp>
+        <p:nvSpPr>
+          <p:cNvPr id="34" name="Rounded Rectangle 33"/>
           <p:cNvSpPr/>
           <p:nvPr/>
         </p:nvSpPr>
         <p:spPr>
           <a:xfrm>
-            <a:off x="575282" y="1458216"/>
-            <a:ext cx="2576836" cy="3514165"/>
+            <a:off x="3477400" y="924232"/>
+            <a:ext cx="8163994" cy="5614220"/>
           </a:xfrm>
           <a:prstGeom prst="roundRect">
             <a:avLst>
@@ -3335,192 +3459,6 @@
           </a:p>
         </p:txBody>
       </p:sp>
-      <p:sp>
-        <p:nvSpPr>
-          <p:cNvPr id="24" name="TextBox 23"/>
-          <p:cNvSpPr txBox="1"/>
-          <p:nvPr/>
-        </p:nvSpPr>
-        <p:spPr>
-          <a:xfrm>
-            <a:off x="959691" y="3575775"/>
-            <a:ext cx="403630" cy="246221"/>
-          </a:xfrm>
-          <a:prstGeom prst="rect">
-            <a:avLst/>
-          </a:prstGeom>
-          <a:noFill/>
-        </p:spPr>
-        <p:txBody>
-          <a:bodyPr wrap="square" rtlCol="0">
-            <a:spAutoFit/>
-          </a:bodyPr>
-          <a:lstStyle/>
-          <a:p>
-            <a:r>
-              <a:rPr lang="en-US" sz="1000" dirty="0" smtClean="0"/>
-              <a:t>DBP</a:t>
-            </a:r>
-            <a:endParaRPr lang="en-US" sz="1000" dirty="0"/>
-          </a:p>
-        </p:txBody>
-      </p:sp>
-      <p:sp>
-        <p:nvSpPr>
-          <p:cNvPr id="25" name="TextBox 24"/>
-          <p:cNvSpPr txBox="1"/>
-          <p:nvPr/>
-        </p:nvSpPr>
-        <p:spPr>
-          <a:xfrm>
-            <a:off x="1955838" y="3379166"/>
-            <a:ext cx="750084" cy="246221"/>
-          </a:xfrm>
-          <a:prstGeom prst="rect">
-            <a:avLst/>
-          </a:prstGeom>
-          <a:noFill/>
-        </p:spPr>
-        <p:txBody>
-          <a:bodyPr wrap="square" rtlCol="0">
-            <a:spAutoFit/>
-          </a:bodyPr>
-          <a:lstStyle/>
-          <a:p>
-            <a:pPr algn="ctr"/>
-            <a:r>
-              <a:rPr lang="en-US" sz="1000" dirty="0" err="1" smtClean="0"/>
-              <a:t>ActiveMQ</a:t>
-            </a:r>
-            <a:endParaRPr lang="en-US" sz="1000" dirty="0"/>
-          </a:p>
-        </p:txBody>
-      </p:sp>
-      <p:cxnSp>
-        <p:nvCxnSpPr>
-          <p:cNvPr id="32" name="Straight Arrow Connector 31"/>
-          <p:cNvCxnSpPr/>
-          <p:nvPr/>
-        </p:nvCxnSpPr>
-        <p:spPr>
-          <a:xfrm flipV="1">
-            <a:off x="1535255" y="3173965"/>
-            <a:ext cx="340503" cy="2"/>
-          </a:xfrm>
-          <a:prstGeom prst="straightConnector1">
-            <a:avLst/>
-          </a:prstGeom>
-          <a:ln>
-            <a:tailEnd type="triangle"/>
-          </a:ln>
-        </p:spPr>
-        <p:style>
-          <a:lnRef idx="1">
-            <a:schemeClr val="accent1"/>
-          </a:lnRef>
-          <a:fillRef idx="0">
-            <a:schemeClr val="accent1"/>
-          </a:fillRef>
-          <a:effectRef idx="0">
-            <a:schemeClr val="accent1"/>
-          </a:effectRef>
-          <a:fontRef idx="minor">
-            <a:schemeClr val="tx1"/>
-          </a:fontRef>
-        </p:style>
-      </p:cxnSp>
-      <p:pic>
-        <p:nvPicPr>
-          <p:cNvPr id="22" name="Picture 21"/>
-          <p:cNvPicPr>
-            <a:picLocks noChangeAspect="1"/>
-          </p:cNvPicPr>
-          <p:nvPr/>
-        </p:nvPicPr>
-        <p:blipFill>
-          <a:blip r:embed="rId8">
-            <a:extLst>
-              <a:ext uri="{28A0092B-C50C-407E-A947-70E740481C1C}">
-                <a14:useLocalDpi xmlns:a14="http://schemas.microsoft.com/office/drawing/2010/main" val="0"/>
-              </a:ext>
-            </a:extLst>
-          </a:blip>
-          <a:stretch>
-            <a:fillRect/>
-          </a:stretch>
-        </p:blipFill>
-        <p:spPr>
-          <a:xfrm>
-            <a:off x="821703" y="1235540"/>
-            <a:ext cx="442306" cy="451117"/>
-          </a:xfrm>
-          <a:prstGeom prst="rect">
-            <a:avLst/>
-          </a:prstGeom>
-        </p:spPr>
-      </p:pic>
-      <p:sp>
-        <p:nvSpPr>
-          <p:cNvPr id="34" name="Rounded Rectangle 33"/>
-          <p:cNvSpPr/>
-          <p:nvPr/>
-        </p:nvSpPr>
-        <p:spPr>
-          <a:xfrm>
-            <a:off x="3477399" y="815788"/>
-            <a:ext cx="8054201" cy="4950012"/>
-          </a:xfrm>
-          <a:prstGeom prst="roundRect">
-            <a:avLst>
-              <a:gd name="adj" fmla="val 9818"/>
-            </a:avLst>
-          </a:prstGeom>
-          <a:noFill/>
-          <a:ln w="6350">
-            <a:solidFill>
-              <a:schemeClr val="tx1"/>
-            </a:solidFill>
-            <a:prstDash val="solid"/>
-          </a:ln>
-          <a:effectLst/>
-        </p:spPr>
-        <p:style>
-          <a:lnRef idx="1">
-            <a:schemeClr val="accent1"/>
-          </a:lnRef>
-          <a:fillRef idx="3">
-            <a:schemeClr val="accent1"/>
-          </a:fillRef>
-          <a:effectRef idx="2">
-            <a:schemeClr val="accent1"/>
-          </a:effectRef>
-          <a:fontRef idx="minor">
-            <a:schemeClr val="lt1"/>
-          </a:fontRef>
-        </p:style>
-        <p:txBody>
-          <a:bodyPr anchor="ctr"/>
-          <a:lstStyle/>
-          <a:p>
-            <a:pPr algn="ctr" fontAlgn="auto">
-              <a:spcBef>
-                <a:spcPts val="0"/>
-              </a:spcBef>
-              <a:spcAft>
-                <a:spcPts val="0"/>
-              </a:spcAft>
-              <a:defRPr/>
-            </a:pPr>
-            <a:endParaRPr lang="en-US" dirty="0">
-              <a:solidFill>
-                <a:schemeClr val="tx1"/>
-              </a:solidFill>
-              <a:latin typeface="Arial"/>
-              <a:cs typeface="Arial"/>
-            </a:endParaRPr>
-          </a:p>
-        </p:txBody>
-      </p:sp>
       <p:pic>
         <p:nvPicPr>
           <p:cNvPr id="35" name="Picture 34"/>
@@ -3543,7 +3481,7 @@
         </p:blipFill>
         <p:spPr>
           <a:xfrm>
-            <a:off x="4051682" y="636625"/>
+            <a:off x="4051682" y="754612"/>
             <a:ext cx="796280" cy="358326"/>
           </a:xfrm>
           <a:prstGeom prst="rect">
@@ -3559,7 +3497,7 @@
         </p:nvCxnSpPr>
         <p:spPr>
           <a:xfrm flipV="1">
-            <a:off x="2786185" y="3167462"/>
+            <a:off x="2786185" y="3786888"/>
             <a:ext cx="965991" cy="5330"/>
           </a:xfrm>
           <a:prstGeom prst="straightConnector1">
@@ -3606,7 +3544,7 @@
         </p:blipFill>
         <p:spPr>
           <a:xfrm>
-            <a:off x="3964635" y="2920954"/>
+            <a:off x="3964635" y="3540380"/>
             <a:ext cx="467068" cy="493017"/>
           </a:xfrm>
           <a:prstGeom prst="rect">
@@ -3622,7 +3560,7 @@
         </p:nvSpPr>
         <p:spPr>
           <a:xfrm>
-            <a:off x="3872755" y="3608902"/>
+            <a:off x="3872755" y="4228328"/>
             <a:ext cx="669781" cy="246221"/>
           </a:xfrm>
           <a:prstGeom prst="rect">
@@ -3667,7 +3605,7 @@
         </p:blipFill>
         <p:spPr>
           <a:xfrm>
-            <a:off x="6929981" y="2845781"/>
+            <a:off x="6929981" y="3465207"/>
             <a:ext cx="544781" cy="653737"/>
           </a:xfrm>
           <a:prstGeom prst="rect">
@@ -3683,7 +3621,7 @@
         </p:nvSpPr>
         <p:spPr>
           <a:xfrm>
-            <a:off x="4748499" y="3619436"/>
+            <a:off x="4748499" y="4238862"/>
             <a:ext cx="806291" cy="246221"/>
           </a:xfrm>
           <a:prstGeom prst="rect">
@@ -3714,7 +3652,7 @@
         </p:nvSpPr>
         <p:spPr>
           <a:xfrm>
-            <a:off x="6807010" y="3560066"/>
+            <a:off x="6807010" y="4179492"/>
             <a:ext cx="806291" cy="400110"/>
           </a:xfrm>
           <a:prstGeom prst="rect">
@@ -3745,7 +3683,7 @@
         </p:nvSpPr>
         <p:spPr>
           <a:xfrm>
-            <a:off x="9206495" y="3560066"/>
+            <a:off x="9424664" y="3498188"/>
             <a:ext cx="778448" cy="400110"/>
           </a:xfrm>
           <a:prstGeom prst="rect">
@@ -3776,7 +3714,7 @@
         </p:nvSpPr>
         <p:spPr>
           <a:xfrm>
-            <a:off x="5810920" y="3624293"/>
+            <a:off x="5810920" y="4243719"/>
             <a:ext cx="561240" cy="246221"/>
           </a:xfrm>
           <a:prstGeom prst="rect">
@@ -3807,7 +3745,7 @@
         </p:nvCxnSpPr>
         <p:spPr>
           <a:xfrm>
-            <a:off x="7586517" y="3150250"/>
+            <a:off x="7586517" y="3769676"/>
             <a:ext cx="236924" cy="0"/>
           </a:xfrm>
           <a:prstGeom prst="straightConnector1">
@@ -3840,7 +3778,7 @@
         </p:nvSpPr>
         <p:spPr>
           <a:xfrm rot="5400000">
-            <a:off x="2141907" y="2892594"/>
+            <a:off x="2141907" y="3512020"/>
             <a:ext cx="384245" cy="560439"/>
           </a:xfrm>
           <a:prstGeom prst="can">
@@ -3894,7 +3832,7 @@
         </p:blipFill>
         <p:spPr>
           <a:xfrm>
-            <a:off x="9323329" y="4261644"/>
+            <a:off x="9283381" y="5303531"/>
             <a:ext cx="544781" cy="653737"/>
           </a:xfrm>
           <a:prstGeom prst="rect">
@@ -3924,7 +3862,7 @@
         </p:blipFill>
         <p:spPr>
           <a:xfrm>
-            <a:off x="9323331" y="2808190"/>
+            <a:off x="9499157" y="2786842"/>
             <a:ext cx="544781" cy="653737"/>
           </a:xfrm>
           <a:prstGeom prst="rect">
@@ -3954,7 +3892,7 @@
         </p:blipFill>
         <p:spPr>
           <a:xfrm>
-            <a:off x="9323329" y="1473477"/>
+            <a:off x="9269107" y="1473475"/>
             <a:ext cx="544781" cy="653737"/>
           </a:xfrm>
           <a:prstGeom prst="rect">
@@ -3984,7 +3922,7 @@
         </p:blipFill>
         <p:spPr>
           <a:xfrm>
-            <a:off x="7982094" y="2859830"/>
+            <a:off x="7982094" y="3479256"/>
             <a:ext cx="518823" cy="625640"/>
           </a:xfrm>
           <a:prstGeom prst="rect">
@@ -3992,88 +3930,6 @@
           </a:prstGeom>
         </p:spPr>
       </p:pic>
-      <p:sp>
-        <p:nvSpPr>
-          <p:cNvPr id="39" name="Freeform 38"/>
-          <p:cNvSpPr/>
-          <p:nvPr/>
-        </p:nvSpPr>
-        <p:spPr>
-          <a:xfrm rot="375323" flipV="1">
-            <a:off x="1404652" y="4088792"/>
-            <a:ext cx="7709946" cy="1024944"/>
-          </a:xfrm>
-          <a:custGeom>
-            <a:avLst/>
-            <a:gdLst>
-              <a:gd name="connsiteX0" fmla="*/ 6017342 w 6017342"/>
-              <a:gd name="connsiteY0" fmla="*/ 818596 h 1054571"/>
-              <a:gd name="connsiteX1" fmla="*/ 2959510 w 6017342"/>
-              <a:gd name="connsiteY1" fmla="*/ 2519 h 1054571"/>
-              <a:gd name="connsiteX2" fmla="*/ 0 w 6017342"/>
-              <a:gd name="connsiteY2" fmla="*/ 1054571 h 1054571"/>
-            </a:gdLst>
-            <a:ahLst/>
-            <a:cxnLst>
-              <a:cxn ang="0">
-                <a:pos x="connsiteX0" y="connsiteY0"/>
-              </a:cxn>
-              <a:cxn ang="0">
-                <a:pos x="connsiteX1" y="connsiteY1"/>
-              </a:cxn>
-              <a:cxn ang="0">
-                <a:pos x="connsiteX2" y="connsiteY2"/>
-              </a:cxn>
-            </a:cxnLst>
-            <a:rect l="l" t="t" r="r" b="b"/>
-            <a:pathLst>
-              <a:path w="6017342" h="1054571">
-                <a:moveTo>
-                  <a:pt x="6017342" y="818596"/>
-                </a:moveTo>
-                <a:cubicBezTo>
-                  <a:pt x="4989871" y="390893"/>
-                  <a:pt x="3962400" y="-36810"/>
-                  <a:pt x="2959510" y="2519"/>
-                </a:cubicBezTo>
-                <a:cubicBezTo>
-                  <a:pt x="1956620" y="41848"/>
-                  <a:pt x="435897" y="893978"/>
-                  <a:pt x="0" y="1054571"/>
-                </a:cubicBezTo>
-              </a:path>
-            </a:pathLst>
-          </a:custGeom>
-          <a:noFill/>
-          <a:ln>
-            <a:tailEnd type="triangle"/>
-          </a:ln>
-        </p:spPr>
-        <p:style>
-          <a:lnRef idx="2">
-            <a:schemeClr val="accent1">
-              <a:shade val="50000"/>
-            </a:schemeClr>
-          </a:lnRef>
-          <a:fillRef idx="1">
-            <a:schemeClr val="accent1"/>
-          </a:fillRef>
-          <a:effectRef idx="0">
-            <a:schemeClr val="accent1"/>
-          </a:effectRef>
-          <a:fontRef idx="minor">
-            <a:schemeClr val="lt1"/>
-          </a:fontRef>
-        </p:style>
-        <p:txBody>
-          <a:bodyPr rtlCol="0" anchor="ctr"/>
-          <a:lstStyle/>
-          <a:p>
-            <a:pPr algn="ctr"/>
-            <a:endParaRPr lang="en-US"/>
-          </a:p>
-        </p:txBody>
-      </p:sp>
       <p:cxnSp>
         <p:nvCxnSpPr>
           <p:cNvPr id="40" name="Straight Arrow Connector 39"/>
@@ -4082,74 +3938,8 @@
         </p:nvCxnSpPr>
         <p:spPr>
           <a:xfrm>
-            <a:off x="8784785" y="1806620"/>
-            <a:ext cx="375903" cy="9029"/>
-          </a:xfrm>
-          <a:prstGeom prst="straightConnector1">
-            <a:avLst/>
-          </a:prstGeom>
-          <a:ln>
-            <a:tailEnd type="triangle"/>
-          </a:ln>
-        </p:spPr>
-        <p:style>
-          <a:lnRef idx="1">
-            <a:schemeClr val="accent1"/>
-          </a:lnRef>
-          <a:fillRef idx="0">
-            <a:schemeClr val="accent1"/>
-          </a:fillRef>
-          <a:effectRef idx="0">
-            <a:schemeClr val="accent1"/>
-          </a:effectRef>
-          <a:fontRef idx="minor">
-            <a:schemeClr val="tx1"/>
-          </a:fontRef>
-        </p:style>
-      </p:cxnSp>
-      <p:cxnSp>
-        <p:nvCxnSpPr>
-          <p:cNvPr id="41" name="Straight Arrow Connector 40"/>
-          <p:cNvCxnSpPr/>
-          <p:nvPr/>
-        </p:nvCxnSpPr>
-        <p:spPr>
-          <a:xfrm>
-            <a:off x="8779895" y="4469992"/>
-            <a:ext cx="375903" cy="9029"/>
-          </a:xfrm>
-          <a:prstGeom prst="straightConnector1">
-            <a:avLst/>
-          </a:prstGeom>
-          <a:ln>
-            <a:tailEnd type="triangle"/>
-          </a:ln>
-        </p:spPr>
-        <p:style>
-          <a:lnRef idx="1">
-            <a:schemeClr val="accent1"/>
-          </a:lnRef>
-          <a:fillRef idx="0">
-            <a:schemeClr val="accent1"/>
-          </a:fillRef>
-          <a:effectRef idx="0">
-            <a:schemeClr val="accent1"/>
-          </a:effectRef>
-          <a:fontRef idx="minor">
-            <a:schemeClr val="tx1"/>
-          </a:fontRef>
-        </p:style>
-      </p:cxnSp>
-      <p:cxnSp>
-        <p:nvCxnSpPr>
-          <p:cNvPr id="42" name="Straight Arrow Connector 41"/>
-          <p:cNvCxnSpPr/>
-          <p:nvPr/>
-        </p:nvCxnSpPr>
-        <p:spPr>
-          <a:xfrm flipV="1">
-            <a:off x="8620519" y="3124140"/>
-            <a:ext cx="540996" cy="5317"/>
+            <a:off x="8786643" y="1806382"/>
+            <a:ext cx="274045" cy="2965"/>
           </a:xfrm>
           <a:prstGeom prst="straightConnector1">
             <a:avLst/>
@@ -4181,8 +3971,8 @@
         </p:nvCxnSpPr>
         <p:spPr>
           <a:xfrm flipH="1">
-            <a:off x="8782260" y="1804511"/>
-            <a:ext cx="8527" cy="2669620"/>
+            <a:off x="8778823" y="1804511"/>
+            <a:ext cx="11966" cy="3916839"/>
           </a:xfrm>
           <a:prstGeom prst="straightConnector1">
             <a:avLst/>
@@ -4214,8 +4004,8 @@
         </p:nvCxnSpPr>
         <p:spPr>
           <a:xfrm>
-            <a:off x="10000006" y="3141783"/>
-            <a:ext cx="327608" cy="3858"/>
+            <a:off x="10182886" y="3122451"/>
+            <a:ext cx="240771" cy="0"/>
           </a:xfrm>
           <a:prstGeom prst="straightConnector1">
             <a:avLst/>
@@ -4247,7 +4037,7 @@
         </p:nvSpPr>
         <p:spPr>
           <a:xfrm>
-            <a:off x="7852763" y="3552181"/>
+            <a:off x="7852763" y="4171607"/>
             <a:ext cx="806291" cy="400110"/>
           </a:xfrm>
           <a:prstGeom prst="rect">
@@ -4278,7 +4068,7 @@
         </p:nvCxnSpPr>
         <p:spPr>
           <a:xfrm>
-            <a:off x="6494197" y="3150250"/>
+            <a:off x="6494197" y="3769676"/>
             <a:ext cx="236924" cy="0"/>
           </a:xfrm>
           <a:prstGeom prst="straightConnector1">
@@ -4311,7 +4101,7 @@
         </p:nvCxnSpPr>
         <p:spPr>
           <a:xfrm>
-            <a:off x="5529184" y="3150768"/>
+            <a:off x="5529184" y="3770194"/>
             <a:ext cx="236924" cy="0"/>
           </a:xfrm>
           <a:prstGeom prst="straightConnector1">
@@ -4344,7 +4134,7 @@
         </p:nvCxnSpPr>
         <p:spPr>
           <a:xfrm>
-            <a:off x="4538587" y="3150250"/>
+            <a:off x="4538587" y="3769676"/>
             <a:ext cx="236924" cy="0"/>
           </a:xfrm>
           <a:prstGeom prst="straightConnector1">
@@ -4377,7 +4167,7 @@
         </p:nvSpPr>
         <p:spPr>
           <a:xfrm>
-            <a:off x="9206495" y="2150226"/>
+            <a:off x="9152627" y="2149309"/>
             <a:ext cx="806291" cy="400110"/>
           </a:xfrm>
           <a:prstGeom prst="rect">
@@ -4408,7 +4198,7 @@
         </p:nvSpPr>
         <p:spPr>
           <a:xfrm>
-            <a:off x="10346690" y="3611308"/>
+            <a:off x="10483127" y="3548850"/>
             <a:ext cx="806291" cy="246221"/>
           </a:xfrm>
           <a:prstGeom prst="rect">
@@ -4439,7 +4229,7 @@
         </p:nvSpPr>
         <p:spPr>
           <a:xfrm>
-            <a:off x="9193715" y="5016794"/>
+            <a:off x="9167038" y="6001816"/>
             <a:ext cx="806291" cy="400110"/>
           </a:xfrm>
           <a:prstGeom prst="rect">
@@ -4459,88 +4249,6 @@
               <a:t>Process Metadata</a:t>
             </a:r>
             <a:endParaRPr lang="en-US" sz="1000" dirty="0"/>
-          </a:p>
-        </p:txBody>
-      </p:sp>
-      <p:sp>
-        <p:nvSpPr>
-          <p:cNvPr id="57" name="Freeform 56"/>
-          <p:cNvSpPr/>
-          <p:nvPr/>
-        </p:nvSpPr>
-        <p:spPr>
-          <a:xfrm rot="21224677">
-            <a:off x="1425006" y="1162685"/>
-            <a:ext cx="7728108" cy="1145720"/>
-          </a:xfrm>
-          <a:custGeom>
-            <a:avLst/>
-            <a:gdLst>
-              <a:gd name="connsiteX0" fmla="*/ 6017342 w 6017342"/>
-              <a:gd name="connsiteY0" fmla="*/ 818596 h 1054571"/>
-              <a:gd name="connsiteX1" fmla="*/ 2959510 w 6017342"/>
-              <a:gd name="connsiteY1" fmla="*/ 2519 h 1054571"/>
-              <a:gd name="connsiteX2" fmla="*/ 0 w 6017342"/>
-              <a:gd name="connsiteY2" fmla="*/ 1054571 h 1054571"/>
-            </a:gdLst>
-            <a:ahLst/>
-            <a:cxnLst>
-              <a:cxn ang="0">
-                <a:pos x="connsiteX0" y="connsiteY0"/>
-              </a:cxn>
-              <a:cxn ang="0">
-                <a:pos x="connsiteX1" y="connsiteY1"/>
-              </a:cxn>
-              <a:cxn ang="0">
-                <a:pos x="connsiteX2" y="connsiteY2"/>
-              </a:cxn>
-            </a:cxnLst>
-            <a:rect l="l" t="t" r="r" b="b"/>
-            <a:pathLst>
-              <a:path w="6017342" h="1054571">
-                <a:moveTo>
-                  <a:pt x="6017342" y="818596"/>
-                </a:moveTo>
-                <a:cubicBezTo>
-                  <a:pt x="4989871" y="390893"/>
-                  <a:pt x="3962400" y="-36810"/>
-                  <a:pt x="2959510" y="2519"/>
-                </a:cubicBezTo>
-                <a:cubicBezTo>
-                  <a:pt x="1956620" y="41848"/>
-                  <a:pt x="435897" y="893978"/>
-                  <a:pt x="0" y="1054571"/>
-                </a:cubicBezTo>
-              </a:path>
-            </a:pathLst>
-          </a:custGeom>
-          <a:noFill/>
-          <a:ln>
-            <a:tailEnd type="triangle"/>
-          </a:ln>
-        </p:spPr>
-        <p:style>
-          <a:lnRef idx="2">
-            <a:schemeClr val="accent1">
-              <a:shade val="50000"/>
-            </a:schemeClr>
-          </a:lnRef>
-          <a:fillRef idx="1">
-            <a:schemeClr val="accent1"/>
-          </a:fillRef>
-          <a:effectRef idx="0">
-            <a:schemeClr val="accent1"/>
-          </a:effectRef>
-          <a:fontRef idx="minor">
-            <a:schemeClr val="lt1"/>
-          </a:fontRef>
-        </p:style>
-        <p:txBody>
-          <a:bodyPr rtlCol="0" anchor="ctr"/>
-          <a:lstStyle/>
-          <a:p>
-            <a:pPr algn="ctr"/>
-            <a:endParaRPr lang="en-US"/>
           </a:p>
         </p:txBody>
       </p:sp>
@@ -4566,7 +4274,7 @@
         </p:blipFill>
         <p:spPr>
           <a:xfrm>
-            <a:off x="10483219" y="1518403"/>
+            <a:off x="10551884" y="1515909"/>
             <a:ext cx="543745" cy="563883"/>
           </a:xfrm>
           <a:prstGeom prst="rect">
@@ -4582,7 +4290,7 @@
         </p:nvCxnSpPr>
         <p:spPr>
           <a:xfrm flipV="1">
-            <a:off x="10745412" y="2184531"/>
+            <a:off x="10848616" y="2184733"/>
             <a:ext cx="1380" cy="524558"/>
           </a:xfrm>
           <a:prstGeom prst="straightConnector1">
@@ -4614,9 +4322,9 @@
           <p:nvPr/>
         </p:nvCxnSpPr>
         <p:spPr>
-          <a:xfrm>
-            <a:off x="10019082" y="1812953"/>
-            <a:ext cx="327608" cy="3858"/>
+          <a:xfrm flipV="1">
+            <a:off x="9976554" y="1811474"/>
+            <a:ext cx="394646" cy="1479"/>
           </a:xfrm>
           <a:prstGeom prst="straightConnector1">
             <a:avLst/>
@@ -4671,6 +4379,499 @@
           </a:p>
         </p:txBody>
       </p:sp>
+      <p:pic>
+        <p:nvPicPr>
+          <p:cNvPr id="64" name="Picture 63"/>
+          <p:cNvPicPr>
+            <a:picLocks noChangeAspect="1"/>
+          </p:cNvPicPr>
+          <p:nvPr/>
+        </p:nvPicPr>
+        <p:blipFill>
+          <a:blip r:embed="rId4">
+            <a:extLst>
+              <a:ext uri="{28A0092B-C50C-407E-A947-70E740481C1C}">
+                <a14:useLocalDpi xmlns:a14="http://schemas.microsoft.com/office/drawing/2010/main" val="0"/>
+              </a:ext>
+            </a:extLst>
+          </a:blip>
+          <a:stretch>
+            <a:fillRect/>
+          </a:stretch>
+        </p:blipFill>
+        <p:spPr>
+          <a:xfrm>
+            <a:off x="9504529" y="4062605"/>
+            <a:ext cx="544781" cy="653737"/>
+          </a:xfrm>
+          <a:prstGeom prst="rect">
+            <a:avLst/>
+          </a:prstGeom>
+        </p:spPr>
+      </p:pic>
+      <p:sp>
+        <p:nvSpPr>
+          <p:cNvPr id="65" name="TextBox 64"/>
+          <p:cNvSpPr txBox="1"/>
+          <p:nvPr/>
+        </p:nvSpPr>
+        <p:spPr>
+          <a:xfrm>
+            <a:off x="9368401" y="4763224"/>
+            <a:ext cx="806291" cy="400110"/>
+          </a:xfrm>
+          <a:prstGeom prst="rect">
+            <a:avLst/>
+          </a:prstGeom>
+          <a:noFill/>
+        </p:spPr>
+        <p:txBody>
+          <a:bodyPr wrap="square" rtlCol="0">
+            <a:spAutoFit/>
+          </a:bodyPr>
+          <a:lstStyle/>
+          <a:p>
+            <a:pPr algn="ctr"/>
+            <a:r>
+              <a:rPr lang="en-US" sz="1000" dirty="0" smtClean="0"/>
+              <a:t>Process </a:t>
+            </a:r>
+            <a:r>
+              <a:rPr lang="en-US" sz="1000" dirty="0" smtClean="0"/>
+              <a:t>Text</a:t>
+            </a:r>
+            <a:endParaRPr lang="en-US" sz="1000" dirty="0"/>
+          </a:p>
+        </p:txBody>
+      </p:sp>
+      <p:cxnSp>
+        <p:nvCxnSpPr>
+          <p:cNvPr id="68" name="Straight Arrow Connector 67"/>
+          <p:cNvCxnSpPr/>
+          <p:nvPr/>
+        </p:nvCxnSpPr>
+        <p:spPr>
+          <a:xfrm>
+            <a:off x="8775804" y="5719294"/>
+            <a:ext cx="274045" cy="2965"/>
+          </a:xfrm>
+          <a:prstGeom prst="straightConnector1">
+            <a:avLst/>
+          </a:prstGeom>
+          <a:ln>
+            <a:tailEnd type="triangle"/>
+          </a:ln>
+        </p:spPr>
+        <p:style>
+          <a:lnRef idx="1">
+            <a:schemeClr val="accent1"/>
+          </a:lnRef>
+          <a:fillRef idx="0">
+            <a:schemeClr val="accent1"/>
+          </a:fillRef>
+          <a:effectRef idx="0">
+            <a:schemeClr val="accent1"/>
+          </a:effectRef>
+          <a:fontRef idx="minor">
+            <a:schemeClr val="tx1"/>
+          </a:fontRef>
+        </p:style>
+      </p:cxnSp>
+      <p:cxnSp>
+        <p:nvCxnSpPr>
+          <p:cNvPr id="69" name="Straight Arrow Connector 68"/>
+          <p:cNvCxnSpPr/>
+          <p:nvPr/>
+        </p:nvCxnSpPr>
+        <p:spPr>
+          <a:xfrm>
+            <a:off x="9075436" y="3139034"/>
+            <a:ext cx="274045" cy="2965"/>
+          </a:xfrm>
+          <a:prstGeom prst="straightConnector1">
+            <a:avLst/>
+          </a:prstGeom>
+          <a:ln>
+            <a:tailEnd type="triangle"/>
+          </a:ln>
+        </p:spPr>
+        <p:style>
+          <a:lnRef idx="1">
+            <a:schemeClr val="accent1"/>
+          </a:lnRef>
+          <a:fillRef idx="0">
+            <a:schemeClr val="accent1"/>
+          </a:fillRef>
+          <a:effectRef idx="0">
+            <a:schemeClr val="accent1"/>
+          </a:effectRef>
+          <a:fontRef idx="minor">
+            <a:schemeClr val="tx1"/>
+          </a:fontRef>
+        </p:style>
+      </p:cxnSp>
+      <p:cxnSp>
+        <p:nvCxnSpPr>
+          <p:cNvPr id="70" name="Straight Arrow Connector 69"/>
+          <p:cNvCxnSpPr/>
+          <p:nvPr/>
+        </p:nvCxnSpPr>
+        <p:spPr>
+          <a:xfrm flipH="1">
+            <a:off x="9068779" y="3140279"/>
+            <a:ext cx="6657" cy="1291374"/>
+          </a:xfrm>
+          <a:prstGeom prst="straightConnector1">
+            <a:avLst/>
+          </a:prstGeom>
+          <a:ln>
+            <a:tailEnd type="none"/>
+          </a:ln>
+        </p:spPr>
+        <p:style>
+          <a:lnRef idx="1">
+            <a:schemeClr val="accent1"/>
+          </a:lnRef>
+          <a:fillRef idx="0">
+            <a:schemeClr val="accent1"/>
+          </a:fillRef>
+          <a:effectRef idx="0">
+            <a:schemeClr val="accent1"/>
+          </a:effectRef>
+          <a:fontRef idx="minor">
+            <a:schemeClr val="tx1"/>
+          </a:fontRef>
+        </p:style>
+      </p:cxnSp>
+      <p:cxnSp>
+        <p:nvCxnSpPr>
+          <p:cNvPr id="71" name="Straight Arrow Connector 70"/>
+          <p:cNvCxnSpPr/>
+          <p:nvPr/>
+        </p:nvCxnSpPr>
+        <p:spPr>
+          <a:xfrm>
+            <a:off x="9069086" y="4430268"/>
+            <a:ext cx="274045" cy="2965"/>
+          </a:xfrm>
+          <a:prstGeom prst="straightConnector1">
+            <a:avLst/>
+          </a:prstGeom>
+          <a:ln>
+            <a:tailEnd type="triangle"/>
+          </a:ln>
+        </p:spPr>
+        <p:style>
+          <a:lnRef idx="1">
+            <a:schemeClr val="accent1"/>
+          </a:lnRef>
+          <a:fillRef idx="0">
+            <a:schemeClr val="accent1"/>
+          </a:fillRef>
+          <a:effectRef idx="0">
+            <a:schemeClr val="accent1"/>
+          </a:effectRef>
+          <a:fontRef idx="minor">
+            <a:schemeClr val="tx1"/>
+          </a:fontRef>
+        </p:style>
+      </p:cxnSp>
+      <p:cxnSp>
+        <p:nvCxnSpPr>
+          <p:cNvPr id="72" name="Straight Arrow Connector 71"/>
+          <p:cNvCxnSpPr/>
+          <p:nvPr/>
+        </p:nvCxnSpPr>
+        <p:spPr>
+          <a:xfrm>
+            <a:off x="8649969" y="3773732"/>
+            <a:ext cx="418064" cy="5631"/>
+          </a:xfrm>
+          <a:prstGeom prst="straightConnector1">
+            <a:avLst/>
+          </a:prstGeom>
+          <a:ln>
+            <a:tailEnd type="none"/>
+          </a:ln>
+        </p:spPr>
+        <p:style>
+          <a:lnRef idx="1">
+            <a:schemeClr val="accent1"/>
+          </a:lnRef>
+          <a:fillRef idx="0">
+            <a:schemeClr val="accent1"/>
+          </a:fillRef>
+          <a:effectRef idx="0">
+            <a:schemeClr val="accent1"/>
+          </a:effectRef>
+          <a:fontRef idx="minor">
+            <a:schemeClr val="tx1"/>
+          </a:fontRef>
+        </p:style>
+      </p:cxnSp>
+      <p:pic>
+        <p:nvPicPr>
+          <p:cNvPr id="26" name="Picture 25"/>
+          <p:cNvPicPr>
+            <a:picLocks noChangeAspect="1"/>
+          </p:cNvPicPr>
+          <p:nvPr/>
+        </p:nvPicPr>
+        <p:blipFill>
+          <a:blip r:embed="rId12">
+            <a:extLst>
+              <a:ext uri="{28A0092B-C50C-407E-A947-70E740481C1C}">
+                <a14:useLocalDpi xmlns:a14="http://schemas.microsoft.com/office/drawing/2010/main" val="0"/>
+              </a:ext>
+            </a:extLst>
+          </a:blip>
+          <a:stretch>
+            <a:fillRect/>
+          </a:stretch>
+        </p:blipFill>
+        <p:spPr>
+          <a:xfrm>
+            <a:off x="10540214" y="4106592"/>
+            <a:ext cx="610794" cy="610794"/>
+          </a:xfrm>
+          <a:prstGeom prst="rect">
+            <a:avLst/>
+          </a:prstGeom>
+        </p:spPr>
+      </p:pic>
+      <p:cxnSp>
+        <p:nvCxnSpPr>
+          <p:cNvPr id="73" name="Straight Arrow Connector 72"/>
+          <p:cNvCxnSpPr/>
+          <p:nvPr/>
+        </p:nvCxnSpPr>
+        <p:spPr>
+          <a:xfrm>
+            <a:off x="10165386" y="4429904"/>
+            <a:ext cx="240771" cy="0"/>
+          </a:xfrm>
+          <a:prstGeom prst="straightConnector1">
+            <a:avLst/>
+          </a:prstGeom>
+          <a:ln>
+            <a:tailEnd type="triangle"/>
+          </a:ln>
+        </p:spPr>
+        <p:style>
+          <a:lnRef idx="1">
+            <a:schemeClr val="accent1"/>
+          </a:lnRef>
+          <a:fillRef idx="0">
+            <a:schemeClr val="accent1"/>
+          </a:fillRef>
+          <a:effectRef idx="0">
+            <a:schemeClr val="accent1"/>
+          </a:effectRef>
+          <a:fontRef idx="minor">
+            <a:schemeClr val="tx1"/>
+          </a:fontRef>
+        </p:style>
+      </p:cxnSp>
+      <p:sp>
+        <p:nvSpPr>
+          <p:cNvPr id="74" name="TextBox 73"/>
+          <p:cNvSpPr txBox="1"/>
+          <p:nvPr/>
+        </p:nvSpPr>
+        <p:spPr>
+          <a:xfrm>
+            <a:off x="10420984" y="4830912"/>
+            <a:ext cx="864323" cy="246221"/>
+          </a:xfrm>
+          <a:prstGeom prst="rect">
+            <a:avLst/>
+          </a:prstGeom>
+          <a:noFill/>
+        </p:spPr>
+        <p:txBody>
+          <a:bodyPr wrap="square" rtlCol="0">
+            <a:spAutoFit/>
+          </a:bodyPr>
+          <a:lstStyle/>
+          <a:p>
+            <a:pPr algn="ctr"/>
+            <a:r>
+              <a:rPr lang="en-US" sz="1000" smtClean="0"/>
+              <a:t>Comprehend</a:t>
+            </a:r>
+            <a:endParaRPr lang="en-US" sz="1000" dirty="0"/>
+          </a:p>
+        </p:txBody>
+      </p:sp>
+      <p:cxnSp>
+        <p:nvCxnSpPr>
+          <p:cNvPr id="91" name="Straight Arrow Connector 90"/>
+          <p:cNvCxnSpPr/>
+          <p:nvPr/>
+        </p:nvCxnSpPr>
+        <p:spPr>
+          <a:xfrm flipH="1">
+            <a:off x="11407308" y="1807955"/>
+            <a:ext cx="11966" cy="2621949"/>
+          </a:xfrm>
+          <a:prstGeom prst="straightConnector1">
+            <a:avLst/>
+          </a:prstGeom>
+          <a:ln>
+            <a:tailEnd type="none"/>
+          </a:ln>
+        </p:spPr>
+        <p:style>
+          <a:lnRef idx="1">
+            <a:schemeClr val="accent1"/>
+          </a:lnRef>
+          <a:fillRef idx="0">
+            <a:schemeClr val="accent1"/>
+          </a:fillRef>
+          <a:effectRef idx="0">
+            <a:schemeClr val="accent1"/>
+          </a:effectRef>
+          <a:fontRef idx="minor">
+            <a:schemeClr val="tx1"/>
+          </a:fontRef>
+        </p:style>
+      </p:cxnSp>
+      <p:cxnSp>
+        <p:nvCxnSpPr>
+          <p:cNvPr id="93" name="Straight Arrow Connector 92"/>
+          <p:cNvCxnSpPr/>
+          <p:nvPr/>
+        </p:nvCxnSpPr>
+        <p:spPr>
+          <a:xfrm flipH="1">
+            <a:off x="11157710" y="1809996"/>
+            <a:ext cx="261564" cy="2957"/>
+          </a:xfrm>
+          <a:prstGeom prst="straightConnector1">
+            <a:avLst/>
+          </a:prstGeom>
+          <a:ln>
+            <a:tailEnd type="triangle"/>
+          </a:ln>
+        </p:spPr>
+        <p:style>
+          <a:lnRef idx="1">
+            <a:schemeClr val="accent1"/>
+          </a:lnRef>
+          <a:fillRef idx="0">
+            <a:schemeClr val="accent1"/>
+          </a:fillRef>
+          <a:effectRef idx="0">
+            <a:schemeClr val="accent1"/>
+          </a:effectRef>
+          <a:fontRef idx="minor">
+            <a:schemeClr val="tx1"/>
+          </a:fontRef>
+        </p:style>
+      </p:cxnSp>
+      <p:cxnSp>
+        <p:nvCxnSpPr>
+          <p:cNvPr id="97" name="Straight Arrow Connector 96"/>
+          <p:cNvCxnSpPr/>
+          <p:nvPr/>
+        </p:nvCxnSpPr>
+        <p:spPr>
+          <a:xfrm>
+            <a:off x="11228566" y="4421865"/>
+            <a:ext cx="182344" cy="1315"/>
+          </a:xfrm>
+          <a:prstGeom prst="straightConnector1">
+            <a:avLst/>
+          </a:prstGeom>
+          <a:ln>
+            <a:tailEnd type="none"/>
+          </a:ln>
+        </p:spPr>
+        <p:style>
+          <a:lnRef idx="1">
+            <a:schemeClr val="accent1"/>
+          </a:lnRef>
+          <a:fillRef idx="0">
+            <a:schemeClr val="accent1"/>
+          </a:fillRef>
+          <a:effectRef idx="0">
+            <a:schemeClr val="accent1"/>
+          </a:effectRef>
+          <a:fontRef idx="minor">
+            <a:schemeClr val="tx1"/>
+          </a:fontRef>
+        </p:style>
+      </p:cxnSp>
+      <p:cxnSp>
+        <p:nvCxnSpPr>
+          <p:cNvPr id="103" name="Curved Connector 102"/>
+          <p:cNvCxnSpPr/>
+          <p:nvPr/>
+        </p:nvCxnSpPr>
+        <p:spPr>
+          <a:xfrm rot="10800000" flipV="1">
+            <a:off x="1484887" y="1617063"/>
+            <a:ext cx="7624498" cy="1718409"/>
+          </a:xfrm>
+          <a:prstGeom prst="curvedConnector3">
+            <a:avLst>
+              <a:gd name="adj1" fmla="val 95813"/>
+            </a:avLst>
+          </a:prstGeom>
+          <a:ln>
+            <a:tailEnd type="triangle"/>
+          </a:ln>
+        </p:spPr>
+        <p:style>
+          <a:lnRef idx="1">
+            <a:schemeClr val="accent1"/>
+          </a:lnRef>
+          <a:fillRef idx="0">
+            <a:schemeClr val="accent1"/>
+          </a:fillRef>
+          <a:effectRef idx="0">
+            <a:schemeClr val="accent1"/>
+          </a:effectRef>
+          <a:fontRef idx="minor">
+            <a:schemeClr val="tx1"/>
+          </a:fontRef>
+        </p:style>
+      </p:cxnSp>
+      <p:cxnSp>
+        <p:nvCxnSpPr>
+          <p:cNvPr id="107" name="Curved Connector 106"/>
+          <p:cNvCxnSpPr/>
+          <p:nvPr/>
+        </p:nvCxnSpPr>
+        <p:spPr>
+          <a:xfrm rot="10800000">
+            <a:off x="1484889" y="4318313"/>
+            <a:ext cx="7661392" cy="1653570"/>
+          </a:xfrm>
+          <a:prstGeom prst="curvedConnector3">
+            <a:avLst>
+              <a:gd name="adj1" fmla="val 96428"/>
+            </a:avLst>
+          </a:prstGeom>
+          <a:ln>
+            <a:tailEnd type="triangle"/>
+          </a:ln>
+        </p:spPr>
+        <p:style>
+          <a:lnRef idx="1">
+            <a:schemeClr val="accent1"/>
+          </a:lnRef>
+          <a:fillRef idx="0">
+            <a:schemeClr val="accent1"/>
+          </a:fillRef>
+          <a:effectRef idx="0">
+            <a:schemeClr val="accent1"/>
+          </a:effectRef>
+          <a:fontRef idx="minor">
+            <a:schemeClr val="tx1"/>
+          </a:fontRef>
+        </p:style>
+      </p:cxnSp>
     </p:spTree>
     <p:extLst>
       <p:ext uri="{BB962C8B-B14F-4D97-AF65-F5344CB8AC3E}">

</xml_diff>